<commit_message>
Update with sbb codes
</commit_message>
<xml_diff>
--- a/Writeup/Graphs.pptx
+++ b/Writeup/Graphs.pptx
@@ -11034,8 +11034,8 @@
           </a:p>
         </p:txBody>
       </p:sp>
-      <mc:AlternateContent xmlns:mc="http://schemas.openxmlformats.org/markup-compatibility/2006" xmlns:a14="http://schemas.microsoft.com/office/drawing/2010/main">
-        <mc:Choice Requires="a14">
+      <mc:AlternateContent xmlns:mc="http://schemas.openxmlformats.org/markup-compatibility/2006">
+        <mc:Choice xmlns:a14="http://schemas.microsoft.com/office/drawing/2010/main" Requires="a14">
           <p:sp>
             <p:nvSpPr>
               <p:cNvPr id="32" name="TextBox 31"/>
@@ -11045,7 +11045,7 @@
             <p:spPr>
               <a:xfrm>
                 <a:off x="1520244" y="498910"/>
-                <a:ext cx="880882" cy="369332"/>
+                <a:ext cx="915955" cy="369332"/>
               </a:xfrm>
               <a:prstGeom prst="rect">
                 <a:avLst/>
@@ -11078,7 +11078,7 @@
                             <a:rPr lang="en-US" b="0" i="1" smtClean="0">
                               <a:latin typeface="Cambria Math" panose="02040503050406030204" pitchFamily="18" charset="0"/>
                             </a:rPr>
-                            <m:t>𝑆</m:t>
+                            <m:t>𝐷</m:t>
                           </m:r>
                         </m:e>
                         <m:sub>
@@ -11104,7 +11104,7 @@
             </p:txBody>
           </p:sp>
         </mc:Choice>
-        <mc:Fallback xmlns="">
+        <mc:Fallback>
           <p:sp>
             <p:nvSpPr>
               <p:cNvPr id="32" name="TextBox 31"/>
@@ -11116,7 +11116,7 @@
             <p:spPr>
               <a:xfrm>
                 <a:off x="1520244" y="498910"/>
-                <a:ext cx="880882" cy="369332"/>
+                <a:ext cx="915955" cy="369332"/>
               </a:xfrm>
               <a:prstGeom prst="rect">
                 <a:avLst/>
@@ -11143,8 +11143,8 @@
           </p:sp>
         </mc:Fallback>
       </mc:AlternateContent>
-      <mc:AlternateContent xmlns:mc="http://schemas.openxmlformats.org/markup-compatibility/2006" xmlns:a14="http://schemas.microsoft.com/office/drawing/2010/main">
-        <mc:Choice Requires="a14">
+      <mc:AlternateContent xmlns:mc="http://schemas.openxmlformats.org/markup-compatibility/2006">
+        <mc:Choice xmlns:a14="http://schemas.microsoft.com/office/drawing/2010/main" Requires="a14">
           <p:sp>
             <p:nvSpPr>
               <p:cNvPr id="33" name="TextBox 32"/>
@@ -11154,7 +11154,7 @@
             <p:spPr>
               <a:xfrm>
                 <a:off x="3190783" y="2710201"/>
-                <a:ext cx="880882" cy="369332"/>
+                <a:ext cx="921278" cy="369332"/>
               </a:xfrm>
               <a:prstGeom prst="rect">
                 <a:avLst/>
@@ -11187,7 +11187,7 @@
                             <a:rPr lang="en-US" b="0" i="1" smtClean="0">
                               <a:latin typeface="Cambria Math" panose="02040503050406030204" pitchFamily="18" charset="0"/>
                             </a:rPr>
-                            <m:t>𝑆</m:t>
+                            <m:t>𝐷</m:t>
                           </m:r>
                         </m:e>
                         <m:sub>
@@ -11213,7 +11213,7 @@
             </p:txBody>
           </p:sp>
         </mc:Choice>
-        <mc:Fallback xmlns="">
+        <mc:Fallback>
           <p:sp>
             <p:nvSpPr>
               <p:cNvPr id="33" name="TextBox 32"/>
@@ -11225,7 +11225,7 @@
             <p:spPr>
               <a:xfrm>
                 <a:off x="3190783" y="2710201"/>
-                <a:ext cx="880882" cy="369332"/>
+                <a:ext cx="921278" cy="369332"/>
               </a:xfrm>
               <a:prstGeom prst="rect">
                 <a:avLst/>
@@ -11252,8 +11252,8 @@
           </p:sp>
         </mc:Fallback>
       </mc:AlternateContent>
-      <mc:AlternateContent xmlns:mc="http://schemas.openxmlformats.org/markup-compatibility/2006" xmlns:a14="http://schemas.microsoft.com/office/drawing/2010/main">
-        <mc:Choice Requires="a14">
+      <mc:AlternateContent xmlns:mc="http://schemas.openxmlformats.org/markup-compatibility/2006">
+        <mc:Choice xmlns:a14="http://schemas.microsoft.com/office/drawing/2010/main" Requires="a14">
           <p:sp>
             <p:nvSpPr>
               <p:cNvPr id="34" name="TextBox 33"/>
@@ -11263,7 +11263,7 @@
             <p:spPr>
               <a:xfrm>
                 <a:off x="5168228" y="498910"/>
-                <a:ext cx="886205" cy="369332"/>
+                <a:ext cx="921278" cy="369332"/>
               </a:xfrm>
               <a:prstGeom prst="rect">
                 <a:avLst/>
@@ -11296,7 +11296,7 @@
                             <a:rPr lang="en-US" b="0" i="1" smtClean="0">
                               <a:latin typeface="Cambria Math" panose="02040503050406030204" pitchFamily="18" charset="0"/>
                             </a:rPr>
-                            <m:t>𝑆</m:t>
+                            <m:t>𝐷</m:t>
                           </m:r>
                         </m:e>
                         <m:sub>
@@ -11322,7 +11322,7 @@
             </p:txBody>
           </p:sp>
         </mc:Choice>
-        <mc:Fallback xmlns="">
+        <mc:Fallback>
           <p:sp>
             <p:nvSpPr>
               <p:cNvPr id="34" name="TextBox 33"/>
@@ -11334,7 +11334,7 @@
             <p:spPr>
               <a:xfrm>
                 <a:off x="5168228" y="498910"/>
-                <a:ext cx="886205" cy="369332"/>
+                <a:ext cx="921278" cy="369332"/>
               </a:xfrm>
               <a:prstGeom prst="rect">
                 <a:avLst/>
@@ -27866,8 +27866,8 @@
           </a:fontRef>
         </p:style>
       </p:cxnSp>
-      <mc:AlternateContent xmlns:mc="http://schemas.openxmlformats.org/markup-compatibility/2006" xmlns:a14="http://schemas.microsoft.com/office/drawing/2010/main">
-        <mc:Choice Requires="a14">
+      <mc:AlternateContent xmlns:mc="http://schemas.openxmlformats.org/markup-compatibility/2006">
+        <mc:Choice xmlns:a14="http://schemas.microsoft.com/office/drawing/2010/main" Requires="a14">
           <p:sp>
             <p:nvSpPr>
               <p:cNvPr id="15" name="TextBox 14">
@@ -27927,7 +27927,7 @@
                               <a:latin typeface="Cambria Math" panose="02040503050406030204" pitchFamily="18" charset="0"/>
                               <a:cs typeface="Times New Roman" panose="02020603050405020304" pitchFamily="18" charset="0"/>
                             </a:rPr>
-                            <m:t>𝑁</m:t>
+                            <m:t>𝑇</m:t>
                           </m:r>
                         </m:sub>
                         <m:sup>
@@ -27958,7 +27958,7 @@
             </p:txBody>
           </p:sp>
         </mc:Choice>
-        <mc:Fallback xmlns="">
+        <mc:Fallback>
           <p:sp>
             <p:nvSpPr>
               <p:cNvPr id="15" name="TextBox 14">
@@ -28516,8 +28516,8 @@
           </p:sp>
         </mc:Fallback>
       </mc:AlternateContent>
-      <mc:AlternateContent xmlns:mc="http://schemas.openxmlformats.org/markup-compatibility/2006" xmlns:a14="http://schemas.microsoft.com/office/drawing/2010/main">
-        <mc:Choice Requires="a14">
+      <mc:AlternateContent xmlns:mc="http://schemas.openxmlformats.org/markup-compatibility/2006">
+        <mc:Choice xmlns:a14="http://schemas.microsoft.com/office/drawing/2010/main" Requires="a14">
           <p:sp>
             <p:nvSpPr>
               <p:cNvPr id="27" name="TextBox 26">
@@ -28532,7 +28532,7 @@
             </p:nvSpPr>
             <p:spPr>
               <a:xfrm>
-                <a:off x="4728139" y="4161857"/>
+                <a:off x="4648627" y="4161857"/>
                 <a:ext cx="2054217" cy="369332"/>
               </a:xfrm>
               <a:prstGeom prst="rect">
@@ -28623,7 +28623,7 @@
             </p:txBody>
           </p:sp>
         </mc:Choice>
-        <mc:Fallback xmlns="">
+        <mc:Fallback>
           <p:sp>
             <p:nvSpPr>
               <p:cNvPr id="27" name="TextBox 26">
@@ -28640,7 +28640,7 @@
             </p:nvSpPr>
             <p:spPr>
               <a:xfrm>
-                <a:off x="4728139" y="4161857"/>
+                <a:off x="4648627" y="4161857"/>
                 <a:ext cx="2054217" cy="369332"/>
               </a:xfrm>
               <a:prstGeom prst="rect">
@@ -28966,8 +28966,8 @@
           </a:fontRef>
         </p:style>
       </p:cxnSp>
-      <mc:AlternateContent xmlns:mc="http://schemas.openxmlformats.org/markup-compatibility/2006" xmlns:a14="http://schemas.microsoft.com/office/drawing/2010/main">
-        <mc:Choice Requires="a14">
+      <mc:AlternateContent xmlns:mc="http://schemas.openxmlformats.org/markup-compatibility/2006">
+        <mc:Choice xmlns:a14="http://schemas.microsoft.com/office/drawing/2010/main" Requires="a14">
           <p:sp>
             <p:nvSpPr>
               <p:cNvPr id="35" name="TextBox 34">
@@ -29027,7 +29027,7 @@
                               <a:latin typeface="Cambria Math" panose="02040503050406030204" pitchFamily="18" charset="0"/>
                               <a:cs typeface="Times New Roman" panose="02020603050405020304" pitchFamily="18" charset="0"/>
                             </a:rPr>
-                            <m:t>𝑁</m:t>
+                            <m:t>𝑇</m:t>
                           </m:r>
                         </m:sub>
                         <m:sup>
@@ -29058,7 +29058,7 @@
             </p:txBody>
           </p:sp>
         </mc:Choice>
-        <mc:Fallback xmlns="">
+        <mc:Fallback>
           <p:sp>
             <p:nvSpPr>
               <p:cNvPr id="35" name="TextBox 34">

</xml_diff>

<commit_message>
Add gurobi environment in subfunctions
</commit_message>
<xml_diff>
--- a/Writeup/Graphs.pptx
+++ b/Writeup/Graphs.pptx
@@ -20,6 +20,10 @@
     <p:sldId id="262" r:id="rId14"/>
     <p:sldId id="263" r:id="rId15"/>
     <p:sldId id="270" r:id="rId16"/>
+    <p:sldId id="271" r:id="rId17"/>
+    <p:sldId id="272" r:id="rId18"/>
+    <p:sldId id="273" r:id="rId19"/>
+    <p:sldId id="274" r:id="rId20"/>
   </p:sldIdLst>
   <p:sldSz cx="12192000" cy="6858000"/>
   <p:notesSz cx="6858000" cy="9144000"/>
@@ -255,7 +259,7 @@
           <a:p>
             <a:fld id="{145BA8CB-6222-6644-996A-CD073B5006A6}" type="datetimeFigureOut">
               <a:rPr lang="en-US" smtClean="0"/>
-              <a:t>5/29/19</a:t>
+              <a:t>6/4/19</a:t>
             </a:fld>
             <a:endParaRPr lang="en-US"/>
           </a:p>
@@ -423,7 +427,7 @@
           <a:p>
             <a:fld id="{145BA8CB-6222-6644-996A-CD073B5006A6}" type="datetimeFigureOut">
               <a:rPr lang="en-US" smtClean="0"/>
-              <a:t>5/29/19</a:t>
+              <a:t>6/4/19</a:t>
             </a:fld>
             <a:endParaRPr lang="en-US"/>
           </a:p>
@@ -601,7 +605,7 @@
           <a:p>
             <a:fld id="{145BA8CB-6222-6644-996A-CD073B5006A6}" type="datetimeFigureOut">
               <a:rPr lang="en-US" smtClean="0"/>
-              <a:t>5/29/19</a:t>
+              <a:t>6/4/19</a:t>
             </a:fld>
             <a:endParaRPr lang="en-US"/>
           </a:p>
@@ -769,7 +773,7 @@
           <a:p>
             <a:fld id="{145BA8CB-6222-6644-996A-CD073B5006A6}" type="datetimeFigureOut">
               <a:rPr lang="en-US" smtClean="0"/>
-              <a:t>5/29/19</a:t>
+              <a:t>6/4/19</a:t>
             </a:fld>
             <a:endParaRPr lang="en-US"/>
           </a:p>
@@ -1014,7 +1018,7 @@
           <a:p>
             <a:fld id="{145BA8CB-6222-6644-996A-CD073B5006A6}" type="datetimeFigureOut">
               <a:rPr lang="en-US" smtClean="0"/>
-              <a:t>5/29/19</a:t>
+              <a:t>6/4/19</a:t>
             </a:fld>
             <a:endParaRPr lang="en-US"/>
           </a:p>
@@ -1243,7 +1247,7 @@
           <a:p>
             <a:fld id="{145BA8CB-6222-6644-996A-CD073B5006A6}" type="datetimeFigureOut">
               <a:rPr lang="en-US" smtClean="0"/>
-              <a:t>5/29/19</a:t>
+              <a:t>6/4/19</a:t>
             </a:fld>
             <a:endParaRPr lang="en-US"/>
           </a:p>
@@ -1607,7 +1611,7 @@
           <a:p>
             <a:fld id="{145BA8CB-6222-6644-996A-CD073B5006A6}" type="datetimeFigureOut">
               <a:rPr lang="en-US" smtClean="0"/>
-              <a:t>5/29/19</a:t>
+              <a:t>6/4/19</a:t>
             </a:fld>
             <a:endParaRPr lang="en-US"/>
           </a:p>
@@ -1724,7 +1728,7 @@
           <a:p>
             <a:fld id="{145BA8CB-6222-6644-996A-CD073B5006A6}" type="datetimeFigureOut">
               <a:rPr lang="en-US" smtClean="0"/>
-              <a:t>5/29/19</a:t>
+              <a:t>6/4/19</a:t>
             </a:fld>
             <a:endParaRPr lang="en-US"/>
           </a:p>
@@ -1819,7 +1823,7 @@
           <a:p>
             <a:fld id="{145BA8CB-6222-6644-996A-CD073B5006A6}" type="datetimeFigureOut">
               <a:rPr lang="en-US" smtClean="0"/>
-              <a:t>5/29/19</a:t>
+              <a:t>6/4/19</a:t>
             </a:fld>
             <a:endParaRPr lang="en-US"/>
           </a:p>
@@ -2094,7 +2098,7 @@
           <a:p>
             <a:fld id="{145BA8CB-6222-6644-996A-CD073B5006A6}" type="datetimeFigureOut">
               <a:rPr lang="en-US" smtClean="0"/>
-              <a:t>5/29/19</a:t>
+              <a:t>6/4/19</a:t>
             </a:fld>
             <a:endParaRPr lang="en-US"/>
           </a:p>
@@ -2346,7 +2350,7 @@
           <a:p>
             <a:fld id="{145BA8CB-6222-6644-996A-CD073B5006A6}" type="datetimeFigureOut">
               <a:rPr lang="en-US" smtClean="0"/>
-              <a:t>5/29/19</a:t>
+              <a:t>6/4/19</a:t>
             </a:fld>
             <a:endParaRPr lang="en-US"/>
           </a:p>
@@ -2557,7 +2561,7 @@
           <a:p>
             <a:fld id="{145BA8CB-6222-6644-996A-CD073B5006A6}" type="datetimeFigureOut">
               <a:rPr lang="en-US" smtClean="0"/>
-              <a:t>5/29/19</a:t>
+              <a:t>6/4/19</a:t>
             </a:fld>
             <a:endParaRPr lang="en-US"/>
           </a:p>
@@ -26340,6 +26344,242 @@
 </p:sld>
 </file>
 
+<file path=ppt/slides/slide16.xml><?xml version="1.0" encoding="utf-8"?>
+<p:sld xmlns:a="http://schemas.openxmlformats.org/drawingml/2006/main" xmlns:r="http://schemas.openxmlformats.org/officeDocument/2006/relationships" xmlns:p="http://schemas.openxmlformats.org/presentationml/2006/main">
+  <p:cSld>
+    <p:spTree>
+      <p:nvGrpSpPr>
+        <p:cNvPr id="1" name=""/>
+        <p:cNvGrpSpPr/>
+        <p:nvPr/>
+      </p:nvGrpSpPr>
+      <p:grpSpPr>
+        <a:xfrm>
+          <a:off x="0" y="0"/>
+          <a:ext cx="0" cy="0"/>
+          <a:chOff x="0" y="0"/>
+          <a:chExt cx="0" cy="0"/>
+        </a:xfrm>
+      </p:grpSpPr>
+      <p:pic>
+        <p:nvPicPr>
+          <p:cNvPr id="6" name="Picture 5" descr="A picture containing sky, text, map, photo&#10;&#10;Description automatically generated">
+            <a:extLst>
+              <a:ext uri="{FF2B5EF4-FFF2-40B4-BE49-F238E27FC236}">
+                <a16:creationId xmlns:a16="http://schemas.microsoft.com/office/drawing/2014/main" id="{B735E9A8-4C41-8F40-8D54-6989B3CAA3BA}"/>
+              </a:ext>
+            </a:extLst>
+          </p:cNvPr>
+          <p:cNvPicPr>
+            <a:picLocks noChangeAspect="1"/>
+          </p:cNvPicPr>
+          <p:nvPr/>
+        </p:nvPicPr>
+        <p:blipFill rotWithShape="1">
+          <a:blip r:embed="rId2"/>
+          <a:srcRect l="12813" t="7273" r="9134" b="10303"/>
+          <a:stretch/>
+        </p:blipFill>
+        <p:spPr>
+          <a:xfrm>
+            <a:off x="2695699" y="498764"/>
+            <a:ext cx="7137070" cy="5652654"/>
+          </a:xfrm>
+          <a:prstGeom prst="rect">
+            <a:avLst/>
+          </a:prstGeom>
+        </p:spPr>
+      </p:pic>
+    </p:spTree>
+    <p:extLst>
+      <p:ext uri="{BB962C8B-B14F-4D97-AF65-F5344CB8AC3E}">
+        <p14:creationId xmlns:p14="http://schemas.microsoft.com/office/powerpoint/2010/main" val="2888021145"/>
+      </p:ext>
+    </p:extLst>
+  </p:cSld>
+  <p:clrMapOvr>
+    <a:masterClrMapping/>
+  </p:clrMapOvr>
+</p:sld>
+</file>
+
+<file path=ppt/slides/slide17.xml><?xml version="1.0" encoding="utf-8"?>
+<p:sld xmlns:a="http://schemas.openxmlformats.org/drawingml/2006/main" xmlns:r="http://schemas.openxmlformats.org/officeDocument/2006/relationships" xmlns:p="http://schemas.openxmlformats.org/presentationml/2006/main">
+  <p:cSld>
+    <p:spTree>
+      <p:nvGrpSpPr>
+        <p:cNvPr id="1" name=""/>
+        <p:cNvGrpSpPr/>
+        <p:nvPr/>
+      </p:nvGrpSpPr>
+      <p:grpSpPr>
+        <a:xfrm>
+          <a:off x="0" y="0"/>
+          <a:ext cx="0" cy="0"/>
+          <a:chOff x="0" y="0"/>
+          <a:chExt cx="0" cy="0"/>
+        </a:xfrm>
+      </p:grpSpPr>
+      <p:pic>
+        <p:nvPicPr>
+          <p:cNvPr id="4" name="Picture 3" descr="A picture containing text, map, sky&#10;&#10;Description automatically generated">
+            <a:extLst>
+              <a:ext uri="{FF2B5EF4-FFF2-40B4-BE49-F238E27FC236}">
+                <a16:creationId xmlns:a16="http://schemas.microsoft.com/office/drawing/2014/main" id="{E5ECC651-4317-8E45-B303-8747EB89510A}"/>
+              </a:ext>
+            </a:extLst>
+          </p:cNvPr>
+          <p:cNvPicPr>
+            <a:picLocks noChangeAspect="1"/>
+          </p:cNvPicPr>
+          <p:nvPr/>
+        </p:nvPicPr>
+        <p:blipFill rotWithShape="1">
+          <a:blip r:embed="rId2"/>
+          <a:srcRect l="12814" t="7273" r="9005" b="10476"/>
+          <a:stretch/>
+        </p:blipFill>
+        <p:spPr>
+          <a:xfrm>
+            <a:off x="2695698" y="498764"/>
+            <a:ext cx="7148945" cy="5640779"/>
+          </a:xfrm>
+          <a:prstGeom prst="rect">
+            <a:avLst/>
+          </a:prstGeom>
+        </p:spPr>
+      </p:pic>
+    </p:spTree>
+    <p:extLst>
+      <p:ext uri="{BB962C8B-B14F-4D97-AF65-F5344CB8AC3E}">
+        <p14:creationId xmlns:p14="http://schemas.microsoft.com/office/powerpoint/2010/main" val="384502942"/>
+      </p:ext>
+    </p:extLst>
+  </p:cSld>
+  <p:clrMapOvr>
+    <a:masterClrMapping/>
+  </p:clrMapOvr>
+</p:sld>
+</file>
+
+<file path=ppt/slides/slide18.xml><?xml version="1.0" encoding="utf-8"?>
+<p:sld xmlns:a="http://schemas.openxmlformats.org/drawingml/2006/main" xmlns:r="http://schemas.openxmlformats.org/officeDocument/2006/relationships" xmlns:p="http://schemas.openxmlformats.org/presentationml/2006/main">
+  <p:cSld>
+    <p:spTree>
+      <p:nvGrpSpPr>
+        <p:cNvPr id="1" name=""/>
+        <p:cNvGrpSpPr/>
+        <p:nvPr/>
+      </p:nvGrpSpPr>
+      <p:grpSpPr>
+        <a:xfrm>
+          <a:off x="0" y="0"/>
+          <a:ext cx="0" cy="0"/>
+          <a:chOff x="0" y="0"/>
+          <a:chExt cx="0" cy="0"/>
+        </a:xfrm>
+      </p:grpSpPr>
+      <p:pic>
+        <p:nvPicPr>
+          <p:cNvPr id="4" name="Picture 3" descr="A close up of a map&#10;&#10;Description automatically generated">
+            <a:extLst>
+              <a:ext uri="{FF2B5EF4-FFF2-40B4-BE49-F238E27FC236}">
+                <a16:creationId xmlns:a16="http://schemas.microsoft.com/office/drawing/2014/main" id="{619CC126-BE75-B948-9D39-CB86498C36DD}"/>
+              </a:ext>
+            </a:extLst>
+          </p:cNvPr>
+          <p:cNvPicPr>
+            <a:picLocks noChangeAspect="1"/>
+          </p:cNvPicPr>
+          <p:nvPr/>
+        </p:nvPicPr>
+        <p:blipFill rotWithShape="1">
+          <a:blip r:embed="rId2"/>
+          <a:srcRect l="12702" t="7447" r="9116" b="10302"/>
+          <a:stretch/>
+        </p:blipFill>
+        <p:spPr>
+          <a:xfrm>
+            <a:off x="2802577" y="510639"/>
+            <a:ext cx="7148946" cy="5640780"/>
+          </a:xfrm>
+          <a:prstGeom prst="rect">
+            <a:avLst/>
+          </a:prstGeom>
+        </p:spPr>
+      </p:pic>
+    </p:spTree>
+    <p:extLst>
+      <p:ext uri="{BB962C8B-B14F-4D97-AF65-F5344CB8AC3E}">
+        <p14:creationId xmlns:p14="http://schemas.microsoft.com/office/powerpoint/2010/main" val="2592295430"/>
+      </p:ext>
+    </p:extLst>
+  </p:cSld>
+  <p:clrMapOvr>
+    <a:masterClrMapping/>
+  </p:clrMapOvr>
+</p:sld>
+</file>
+
+<file path=ppt/slides/slide19.xml><?xml version="1.0" encoding="utf-8"?>
+<p:sld xmlns:a="http://schemas.openxmlformats.org/drawingml/2006/main" xmlns:r="http://schemas.openxmlformats.org/officeDocument/2006/relationships" xmlns:p="http://schemas.openxmlformats.org/presentationml/2006/main">
+  <p:cSld>
+    <p:spTree>
+      <p:nvGrpSpPr>
+        <p:cNvPr id="1" name=""/>
+        <p:cNvGrpSpPr/>
+        <p:nvPr/>
+      </p:nvGrpSpPr>
+      <p:grpSpPr>
+        <a:xfrm>
+          <a:off x="0" y="0"/>
+          <a:ext cx="0" cy="0"/>
+          <a:chOff x="0" y="0"/>
+          <a:chExt cx="0" cy="0"/>
+        </a:xfrm>
+      </p:grpSpPr>
+      <p:pic>
+        <p:nvPicPr>
+          <p:cNvPr id="4" name="Picture 3" descr="A close up of a map&#10;&#10;Description automatically generated">
+            <a:extLst>
+              <a:ext uri="{FF2B5EF4-FFF2-40B4-BE49-F238E27FC236}">
+                <a16:creationId xmlns:a16="http://schemas.microsoft.com/office/drawing/2014/main" id="{20B2A667-CC0E-6943-973D-B9B5B4B9B3D7}"/>
+              </a:ext>
+            </a:extLst>
+          </p:cNvPr>
+          <p:cNvPicPr>
+            <a:picLocks noChangeAspect="1"/>
+          </p:cNvPicPr>
+          <p:nvPr/>
+        </p:nvPicPr>
+        <p:blipFill rotWithShape="1">
+          <a:blip r:embed="rId2"/>
+          <a:srcRect l="12681" t="7273" r="8936" b="10476"/>
+          <a:stretch/>
+        </p:blipFill>
+        <p:spPr>
+          <a:xfrm>
+            <a:off x="2624446" y="498764"/>
+            <a:ext cx="7291449" cy="5640779"/>
+          </a:xfrm>
+          <a:prstGeom prst="rect">
+            <a:avLst/>
+          </a:prstGeom>
+        </p:spPr>
+      </p:pic>
+    </p:spTree>
+    <p:extLst>
+      <p:ext uri="{BB962C8B-B14F-4D97-AF65-F5344CB8AC3E}">
+        <p14:creationId xmlns:p14="http://schemas.microsoft.com/office/powerpoint/2010/main" val="1130784626"/>
+      </p:ext>
+    </p:extLst>
+  </p:cSld>
+  <p:clrMapOvr>
+    <a:masterClrMapping/>
+  </p:clrMapOvr>
+</p:sld>
+</file>
+
 <file path=ppt/slides/slide2.xml><?xml version="1.0" encoding="utf-8"?>
 <p:sld xmlns:a="http://schemas.openxmlformats.org/drawingml/2006/main" xmlns:r="http://schemas.openxmlformats.org/officeDocument/2006/relationships" xmlns:p="http://schemas.openxmlformats.org/presentationml/2006/main">
   <p:cSld>

</xml_diff>

<commit_message>
Add cutSelection for test
</commit_message>
<xml_diff>
--- a/Writeup/Graphs.pptx
+++ b/Writeup/Graphs.pptx
@@ -259,7 +259,7 @@
           <a:p>
             <a:fld id="{145BA8CB-6222-6644-996A-CD073B5006A6}" type="datetimeFigureOut">
               <a:rPr lang="en-US" smtClean="0"/>
-              <a:t>6/4/19</a:t>
+              <a:t>6/6/19</a:t>
             </a:fld>
             <a:endParaRPr lang="en-US"/>
           </a:p>
@@ -427,7 +427,7 @@
           <a:p>
             <a:fld id="{145BA8CB-6222-6644-996A-CD073B5006A6}" type="datetimeFigureOut">
               <a:rPr lang="en-US" smtClean="0"/>
-              <a:t>6/4/19</a:t>
+              <a:t>6/6/19</a:t>
             </a:fld>
             <a:endParaRPr lang="en-US"/>
           </a:p>
@@ -605,7 +605,7 @@
           <a:p>
             <a:fld id="{145BA8CB-6222-6644-996A-CD073B5006A6}" type="datetimeFigureOut">
               <a:rPr lang="en-US" smtClean="0"/>
-              <a:t>6/4/19</a:t>
+              <a:t>6/6/19</a:t>
             </a:fld>
             <a:endParaRPr lang="en-US"/>
           </a:p>
@@ -773,7 +773,7 @@
           <a:p>
             <a:fld id="{145BA8CB-6222-6644-996A-CD073B5006A6}" type="datetimeFigureOut">
               <a:rPr lang="en-US" smtClean="0"/>
-              <a:t>6/4/19</a:t>
+              <a:t>6/6/19</a:t>
             </a:fld>
             <a:endParaRPr lang="en-US"/>
           </a:p>
@@ -1018,7 +1018,7 @@
           <a:p>
             <a:fld id="{145BA8CB-6222-6644-996A-CD073B5006A6}" type="datetimeFigureOut">
               <a:rPr lang="en-US" smtClean="0"/>
-              <a:t>6/4/19</a:t>
+              <a:t>6/6/19</a:t>
             </a:fld>
             <a:endParaRPr lang="en-US"/>
           </a:p>
@@ -1247,7 +1247,7 @@
           <a:p>
             <a:fld id="{145BA8CB-6222-6644-996A-CD073B5006A6}" type="datetimeFigureOut">
               <a:rPr lang="en-US" smtClean="0"/>
-              <a:t>6/4/19</a:t>
+              <a:t>6/6/19</a:t>
             </a:fld>
             <a:endParaRPr lang="en-US"/>
           </a:p>
@@ -1611,7 +1611,7 @@
           <a:p>
             <a:fld id="{145BA8CB-6222-6644-996A-CD073B5006A6}" type="datetimeFigureOut">
               <a:rPr lang="en-US" smtClean="0"/>
-              <a:t>6/4/19</a:t>
+              <a:t>6/6/19</a:t>
             </a:fld>
             <a:endParaRPr lang="en-US"/>
           </a:p>
@@ -1728,7 +1728,7 @@
           <a:p>
             <a:fld id="{145BA8CB-6222-6644-996A-CD073B5006A6}" type="datetimeFigureOut">
               <a:rPr lang="en-US" smtClean="0"/>
-              <a:t>6/4/19</a:t>
+              <a:t>6/6/19</a:t>
             </a:fld>
             <a:endParaRPr lang="en-US"/>
           </a:p>
@@ -1823,7 +1823,7 @@
           <a:p>
             <a:fld id="{145BA8CB-6222-6644-996A-CD073B5006A6}" type="datetimeFigureOut">
               <a:rPr lang="en-US" smtClean="0"/>
-              <a:t>6/4/19</a:t>
+              <a:t>6/6/19</a:t>
             </a:fld>
             <a:endParaRPr lang="en-US"/>
           </a:p>
@@ -2098,7 +2098,7 @@
           <a:p>
             <a:fld id="{145BA8CB-6222-6644-996A-CD073B5006A6}" type="datetimeFigureOut">
               <a:rPr lang="en-US" smtClean="0"/>
-              <a:t>6/4/19</a:t>
+              <a:t>6/6/19</a:t>
             </a:fld>
             <a:endParaRPr lang="en-US"/>
           </a:p>
@@ -2350,7 +2350,7 @@
           <a:p>
             <a:fld id="{145BA8CB-6222-6644-996A-CD073B5006A6}" type="datetimeFigureOut">
               <a:rPr lang="en-US" smtClean="0"/>
-              <a:t>6/4/19</a:t>
+              <a:t>6/6/19</a:t>
             </a:fld>
             <a:endParaRPr lang="en-US"/>
           </a:p>
@@ -2561,7 +2561,7 @@
           <a:p>
             <a:fld id="{145BA8CB-6222-6644-996A-CD073B5006A6}" type="datetimeFigureOut">
               <a:rPr lang="en-US" smtClean="0"/>
-              <a:t>6/4/19</a:t>
+              <a:t>6/6/19</a:t>
             </a:fld>
             <a:endParaRPr lang="en-US"/>
           </a:p>
@@ -25748,10 +25748,10 @@
       </p:grpSpPr>
       <p:grpSp>
         <p:nvGrpSpPr>
-          <p:cNvPr id="18" name="Group 17">
+          <p:cNvPr id="2" name="Group 1">
             <a:extLst>
               <a:ext uri="{FF2B5EF4-FFF2-40B4-BE49-F238E27FC236}">
-                <a16:creationId xmlns:a16="http://schemas.microsoft.com/office/drawing/2014/main" id="{4CBFC1E6-F0E2-2541-A3A5-9E63BF2D2948}"/>
+                <a16:creationId xmlns:a16="http://schemas.microsoft.com/office/drawing/2014/main" id="{81114597-0471-9842-9172-B5564395D1E1}"/>
               </a:ext>
             </a:extLst>
           </p:cNvPr>
@@ -25760,18 +25760,603 @@
         </p:nvGrpSpPr>
         <p:grpSpPr>
           <a:xfrm>
-            <a:off x="2205375" y="1215664"/>
-            <a:ext cx="7730195" cy="695302"/>
-            <a:chOff x="2597271" y="1019716"/>
-            <a:chExt cx="9908700" cy="891250"/>
+            <a:off x="814771" y="1215664"/>
+            <a:ext cx="9120799" cy="695302"/>
+            <a:chOff x="814771" y="1215664"/>
+            <a:chExt cx="9120799" cy="695302"/>
           </a:xfrm>
         </p:grpSpPr>
+        <p:grpSp>
+          <p:nvGrpSpPr>
+            <p:cNvPr id="18" name="Group 17">
+              <a:extLst>
+                <a:ext uri="{FF2B5EF4-FFF2-40B4-BE49-F238E27FC236}">
+                  <a16:creationId xmlns:a16="http://schemas.microsoft.com/office/drawing/2014/main" id="{4CBFC1E6-F0E2-2541-A3A5-9E63BF2D2948}"/>
+                </a:ext>
+              </a:extLst>
+            </p:cNvPr>
+            <p:cNvGrpSpPr/>
+            <p:nvPr/>
+          </p:nvGrpSpPr>
+          <p:grpSpPr>
+            <a:xfrm>
+              <a:off x="2205375" y="1215664"/>
+              <a:ext cx="7730195" cy="695302"/>
+              <a:chOff x="2597271" y="1019716"/>
+              <a:chExt cx="9908700" cy="891250"/>
+            </a:xfrm>
+          </p:grpSpPr>
+          <p:sp>
+            <p:nvSpPr>
+              <p:cNvPr id="5" name="Oval 4">
+                <a:extLst>
+                  <a:ext uri="{FF2B5EF4-FFF2-40B4-BE49-F238E27FC236}">
+                    <a16:creationId xmlns:a16="http://schemas.microsoft.com/office/drawing/2014/main" id="{893A9382-1549-904F-83F2-B24A1FB76ABC}"/>
+                  </a:ext>
+                </a:extLst>
+              </p:cNvPr>
+              <p:cNvSpPr/>
+              <p:nvPr/>
+            </p:nvSpPr>
+            <p:spPr>
+              <a:xfrm>
+                <a:off x="2597271" y="1019716"/>
+                <a:ext cx="891250" cy="891250"/>
+              </a:xfrm>
+              <a:prstGeom prst="ellipse">
+                <a:avLst/>
+              </a:prstGeom>
+              <a:noFill/>
+              <a:ln w="38100">
+                <a:solidFill>
+                  <a:schemeClr val="tx1"/>
+                </a:solidFill>
+              </a:ln>
+            </p:spPr>
+            <p:style>
+              <a:lnRef idx="2">
+                <a:schemeClr val="accent1">
+                  <a:shade val="50000"/>
+                </a:schemeClr>
+              </a:lnRef>
+              <a:fillRef idx="1">
+                <a:schemeClr val="accent1"/>
+              </a:fillRef>
+              <a:effectRef idx="0">
+                <a:schemeClr val="accent1"/>
+              </a:effectRef>
+              <a:fontRef idx="minor">
+                <a:schemeClr val="lt1"/>
+              </a:fontRef>
+            </p:style>
+            <p:txBody>
+              <a:bodyPr rtlCol="0" anchor="ctr"/>
+              <a:lstStyle/>
+              <a:p>
+                <a:pPr algn="ctr"/>
+                <a:r>
+                  <a:rPr lang="en-US" sz="3200" dirty="0">
+                    <a:solidFill>
+                      <a:sysClr val="windowText" lastClr="000000"/>
+                    </a:solidFill>
+                  </a:rPr>
+                  <a:t>1</a:t>
+                </a:r>
+              </a:p>
+            </p:txBody>
+          </p:sp>
+          <p:sp>
+            <p:nvSpPr>
+              <p:cNvPr id="6" name="Oval 5">
+                <a:extLst>
+                  <a:ext uri="{FF2B5EF4-FFF2-40B4-BE49-F238E27FC236}">
+                    <a16:creationId xmlns:a16="http://schemas.microsoft.com/office/drawing/2014/main" id="{92DE978B-205D-604F-AD8E-68E6DDEC64D5}"/>
+                  </a:ext>
+                </a:extLst>
+              </p:cNvPr>
+              <p:cNvSpPr/>
+              <p:nvPr/>
+            </p:nvSpPr>
+            <p:spPr>
+              <a:xfrm>
+                <a:off x="4407021" y="1019716"/>
+                <a:ext cx="891250" cy="891250"/>
+              </a:xfrm>
+              <a:prstGeom prst="ellipse">
+                <a:avLst/>
+              </a:prstGeom>
+              <a:noFill/>
+              <a:ln w="38100">
+                <a:solidFill>
+                  <a:schemeClr val="tx1"/>
+                </a:solidFill>
+              </a:ln>
+            </p:spPr>
+            <p:style>
+              <a:lnRef idx="2">
+                <a:schemeClr val="accent1">
+                  <a:shade val="50000"/>
+                </a:schemeClr>
+              </a:lnRef>
+              <a:fillRef idx="1">
+                <a:schemeClr val="accent1"/>
+              </a:fillRef>
+              <a:effectRef idx="0">
+                <a:schemeClr val="accent1"/>
+              </a:effectRef>
+              <a:fontRef idx="minor">
+                <a:schemeClr val="lt1"/>
+              </a:fontRef>
+            </p:style>
+            <p:txBody>
+              <a:bodyPr rtlCol="0" anchor="ctr"/>
+              <a:lstStyle/>
+              <a:p>
+                <a:pPr algn="ctr"/>
+                <a:r>
+                  <a:rPr lang="en-US" sz="3200" dirty="0">
+                    <a:solidFill>
+                      <a:sysClr val="windowText" lastClr="000000"/>
+                    </a:solidFill>
+                  </a:rPr>
+                  <a:t>2</a:t>
+                </a:r>
+              </a:p>
+            </p:txBody>
+          </p:sp>
+          <p:cxnSp>
+            <p:nvCxnSpPr>
+              <p:cNvPr id="7" name="Straight Arrow Connector 6">
+                <a:extLst>
+                  <a:ext uri="{FF2B5EF4-FFF2-40B4-BE49-F238E27FC236}">
+                    <a16:creationId xmlns:a16="http://schemas.microsoft.com/office/drawing/2014/main" id="{36601249-6231-F04D-989B-385C5BA586DC}"/>
+                  </a:ext>
+                </a:extLst>
+              </p:cNvPr>
+              <p:cNvCxnSpPr/>
+              <p:nvPr/>
+            </p:nvCxnSpPr>
+            <p:spPr>
+              <a:xfrm>
+                <a:off x="3488521" y="1465341"/>
+                <a:ext cx="918500" cy="0"/>
+              </a:xfrm>
+              <a:prstGeom prst="straightConnector1">
+                <a:avLst/>
+              </a:prstGeom>
+              <a:ln w="38100">
+                <a:solidFill>
+                  <a:schemeClr val="tx1"/>
+                </a:solidFill>
+                <a:tailEnd type="triangle"/>
+              </a:ln>
+            </p:spPr>
+            <p:style>
+              <a:lnRef idx="1">
+                <a:schemeClr val="accent1"/>
+              </a:lnRef>
+              <a:fillRef idx="0">
+                <a:schemeClr val="accent1"/>
+              </a:fillRef>
+              <a:effectRef idx="0">
+                <a:schemeClr val="accent1"/>
+              </a:effectRef>
+              <a:fontRef idx="minor">
+                <a:schemeClr val="tx1"/>
+              </a:fontRef>
+            </p:style>
+          </p:cxnSp>
+          <p:cxnSp>
+            <p:nvCxnSpPr>
+              <p:cNvPr id="8" name="Straight Arrow Connector 7">
+                <a:extLst>
+                  <a:ext uri="{FF2B5EF4-FFF2-40B4-BE49-F238E27FC236}">
+                    <a16:creationId xmlns:a16="http://schemas.microsoft.com/office/drawing/2014/main" id="{EA528967-387F-2546-A193-8116B0DFC977}"/>
+                  </a:ext>
+                </a:extLst>
+              </p:cNvPr>
+              <p:cNvCxnSpPr/>
+              <p:nvPr/>
+            </p:nvCxnSpPr>
+            <p:spPr>
+              <a:xfrm>
+                <a:off x="5298271" y="1465341"/>
+                <a:ext cx="918500" cy="0"/>
+              </a:xfrm>
+              <a:prstGeom prst="straightConnector1">
+                <a:avLst/>
+              </a:prstGeom>
+              <a:ln w="38100">
+                <a:solidFill>
+                  <a:schemeClr val="tx1"/>
+                </a:solidFill>
+                <a:tailEnd type="triangle"/>
+              </a:ln>
+            </p:spPr>
+            <p:style>
+              <a:lnRef idx="1">
+                <a:schemeClr val="accent1"/>
+              </a:lnRef>
+              <a:fillRef idx="0">
+                <a:schemeClr val="accent1"/>
+              </a:fillRef>
+              <a:effectRef idx="0">
+                <a:schemeClr val="accent1"/>
+              </a:effectRef>
+              <a:fontRef idx="minor">
+                <a:schemeClr val="tx1"/>
+              </a:fontRef>
+            </p:style>
+          </p:cxnSp>
+          <p:sp>
+            <p:nvSpPr>
+              <p:cNvPr id="9" name="Oval 8">
+                <a:extLst>
+                  <a:ext uri="{FF2B5EF4-FFF2-40B4-BE49-F238E27FC236}">
+                    <a16:creationId xmlns:a16="http://schemas.microsoft.com/office/drawing/2014/main" id="{C3953FE9-4811-BF4E-B143-8DCC5C6F7029}"/>
+                  </a:ext>
+                </a:extLst>
+              </p:cNvPr>
+              <p:cNvSpPr/>
+              <p:nvPr/>
+            </p:nvSpPr>
+            <p:spPr>
+              <a:xfrm>
+                <a:off x="11614721" y="1019716"/>
+                <a:ext cx="891250" cy="891250"/>
+              </a:xfrm>
+              <a:prstGeom prst="ellipse">
+                <a:avLst/>
+              </a:prstGeom>
+              <a:noFill/>
+              <a:ln w="38100">
+                <a:solidFill>
+                  <a:schemeClr val="tx1"/>
+                </a:solidFill>
+              </a:ln>
+            </p:spPr>
+            <p:style>
+              <a:lnRef idx="2">
+                <a:schemeClr val="accent1">
+                  <a:shade val="50000"/>
+                </a:schemeClr>
+              </a:lnRef>
+              <a:fillRef idx="1">
+                <a:schemeClr val="accent1"/>
+              </a:fillRef>
+              <a:effectRef idx="0">
+                <a:schemeClr val="accent1"/>
+              </a:effectRef>
+              <a:fontRef idx="minor">
+                <a:schemeClr val="lt1"/>
+              </a:fontRef>
+            </p:style>
+            <p:txBody>
+              <a:bodyPr rtlCol="0" anchor="ctr"/>
+              <a:lstStyle/>
+              <a:p>
+                <a:pPr algn="ctr"/>
+                <a:r>
+                  <a:rPr lang="en-US" sz="3200" dirty="0">
+                    <a:solidFill>
+                      <a:sysClr val="windowText" lastClr="000000"/>
+                    </a:solidFill>
+                  </a:rPr>
+                  <a:t>T</a:t>
+                </a:r>
+              </a:p>
+            </p:txBody>
+          </p:sp>
+          <p:sp>
+            <p:nvSpPr>
+              <p:cNvPr id="12" name="Oval 11">
+                <a:extLst>
+                  <a:ext uri="{FF2B5EF4-FFF2-40B4-BE49-F238E27FC236}">
+                    <a16:creationId xmlns:a16="http://schemas.microsoft.com/office/drawing/2014/main" id="{A250C80C-B89E-D24A-A7AD-EEBE9C8119A0}"/>
+                  </a:ext>
+                </a:extLst>
+              </p:cNvPr>
+              <p:cNvSpPr/>
+              <p:nvPr/>
+            </p:nvSpPr>
+            <p:spPr>
+              <a:xfrm>
+                <a:off x="6212721" y="1019716"/>
+                <a:ext cx="891250" cy="891250"/>
+              </a:xfrm>
+              <a:prstGeom prst="ellipse">
+                <a:avLst/>
+              </a:prstGeom>
+              <a:noFill/>
+              <a:ln w="38100">
+                <a:solidFill>
+                  <a:schemeClr val="tx1"/>
+                </a:solidFill>
+              </a:ln>
+            </p:spPr>
+            <p:style>
+              <a:lnRef idx="2">
+                <a:schemeClr val="accent1">
+                  <a:shade val="50000"/>
+                </a:schemeClr>
+              </a:lnRef>
+              <a:fillRef idx="1">
+                <a:schemeClr val="accent1"/>
+              </a:fillRef>
+              <a:effectRef idx="0">
+                <a:schemeClr val="accent1"/>
+              </a:effectRef>
+              <a:fontRef idx="minor">
+                <a:schemeClr val="lt1"/>
+              </a:fontRef>
+            </p:style>
+            <p:txBody>
+              <a:bodyPr rtlCol="0" anchor="ctr"/>
+              <a:lstStyle/>
+              <a:p>
+                <a:pPr algn="ctr"/>
+                <a:r>
+                  <a:rPr lang="en-US" sz="3200" dirty="0">
+                    <a:solidFill>
+                      <a:sysClr val="windowText" lastClr="000000"/>
+                    </a:solidFill>
+                  </a:rPr>
+                  <a:t>3</a:t>
+                </a:r>
+              </a:p>
+            </p:txBody>
+          </p:sp>
+          <p:sp>
+            <p:nvSpPr>
+              <p:cNvPr id="13" name="Oval 12">
+                <a:extLst>
+                  <a:ext uri="{FF2B5EF4-FFF2-40B4-BE49-F238E27FC236}">
+                    <a16:creationId xmlns:a16="http://schemas.microsoft.com/office/drawing/2014/main" id="{9368A4EB-0546-C840-B0CC-2D473D490FD5}"/>
+                  </a:ext>
+                </a:extLst>
+              </p:cNvPr>
+              <p:cNvSpPr/>
+              <p:nvPr/>
+            </p:nvSpPr>
+            <p:spPr>
+              <a:xfrm>
+                <a:off x="8022471" y="1019716"/>
+                <a:ext cx="891250" cy="891250"/>
+              </a:xfrm>
+              <a:prstGeom prst="ellipse">
+                <a:avLst/>
+              </a:prstGeom>
+              <a:noFill/>
+              <a:ln w="38100">
+                <a:solidFill>
+                  <a:schemeClr val="tx1"/>
+                </a:solidFill>
+              </a:ln>
+            </p:spPr>
+            <p:style>
+              <a:lnRef idx="2">
+                <a:schemeClr val="accent1">
+                  <a:shade val="50000"/>
+                </a:schemeClr>
+              </a:lnRef>
+              <a:fillRef idx="1">
+                <a:schemeClr val="accent1"/>
+              </a:fillRef>
+              <a:effectRef idx="0">
+                <a:schemeClr val="accent1"/>
+              </a:effectRef>
+              <a:fontRef idx="minor">
+                <a:schemeClr val="lt1"/>
+              </a:fontRef>
+            </p:style>
+            <p:txBody>
+              <a:bodyPr rtlCol="0" anchor="ctr"/>
+              <a:lstStyle/>
+              <a:p>
+                <a:pPr algn="ctr"/>
+                <a:r>
+                  <a:rPr lang="en-US" sz="3200" dirty="0">
+                    <a:solidFill>
+                      <a:sysClr val="windowText" lastClr="000000"/>
+                    </a:solidFill>
+                  </a:rPr>
+                  <a:t>4</a:t>
+                </a:r>
+              </a:p>
+            </p:txBody>
+          </p:sp>
+          <p:cxnSp>
+            <p:nvCxnSpPr>
+              <p:cNvPr id="14" name="Straight Arrow Connector 13">
+                <a:extLst>
+                  <a:ext uri="{FF2B5EF4-FFF2-40B4-BE49-F238E27FC236}">
+                    <a16:creationId xmlns:a16="http://schemas.microsoft.com/office/drawing/2014/main" id="{159E520E-2509-5546-AC70-FB4705BBA269}"/>
+                  </a:ext>
+                </a:extLst>
+              </p:cNvPr>
+              <p:cNvCxnSpPr/>
+              <p:nvPr/>
+            </p:nvCxnSpPr>
+            <p:spPr>
+              <a:xfrm>
+                <a:off x="7103971" y="1465341"/>
+                <a:ext cx="918500" cy="0"/>
+              </a:xfrm>
+              <a:prstGeom prst="straightConnector1">
+                <a:avLst/>
+              </a:prstGeom>
+              <a:ln w="38100">
+                <a:solidFill>
+                  <a:schemeClr val="tx1"/>
+                </a:solidFill>
+                <a:tailEnd type="triangle"/>
+              </a:ln>
+            </p:spPr>
+            <p:style>
+              <a:lnRef idx="1">
+                <a:schemeClr val="accent1"/>
+              </a:lnRef>
+              <a:fillRef idx="0">
+                <a:schemeClr val="accent1"/>
+              </a:fillRef>
+              <a:effectRef idx="0">
+                <a:schemeClr val="accent1"/>
+              </a:effectRef>
+              <a:fontRef idx="minor">
+                <a:schemeClr val="tx1"/>
+              </a:fontRef>
+            </p:style>
+          </p:cxnSp>
+          <p:cxnSp>
+            <p:nvCxnSpPr>
+              <p:cNvPr id="15" name="Straight Arrow Connector 14">
+                <a:extLst>
+                  <a:ext uri="{FF2B5EF4-FFF2-40B4-BE49-F238E27FC236}">
+                    <a16:creationId xmlns:a16="http://schemas.microsoft.com/office/drawing/2014/main" id="{0153D359-2C6C-4041-B3A8-F84C3CE1A5C3}"/>
+                  </a:ext>
+                </a:extLst>
+              </p:cNvPr>
+              <p:cNvCxnSpPr/>
+              <p:nvPr/>
+            </p:nvCxnSpPr>
+            <p:spPr>
+              <a:xfrm>
+                <a:off x="8913721" y="1465341"/>
+                <a:ext cx="918500" cy="0"/>
+              </a:xfrm>
+              <a:prstGeom prst="straightConnector1">
+                <a:avLst/>
+              </a:prstGeom>
+              <a:ln w="38100">
+                <a:solidFill>
+                  <a:schemeClr val="tx1"/>
+                </a:solidFill>
+                <a:tailEnd type="triangle"/>
+              </a:ln>
+            </p:spPr>
+            <p:style>
+              <a:lnRef idx="1">
+                <a:schemeClr val="accent1"/>
+              </a:lnRef>
+              <a:fillRef idx="0">
+                <a:schemeClr val="accent1"/>
+              </a:fillRef>
+              <a:effectRef idx="0">
+                <a:schemeClr val="accent1"/>
+              </a:effectRef>
+              <a:fontRef idx="minor">
+                <a:schemeClr val="tx1"/>
+              </a:fontRef>
+            </p:style>
+          </p:cxnSp>
+          <p:sp>
+            <p:nvSpPr>
+              <p:cNvPr id="16" name="Oval 15">
+                <a:extLst>
+                  <a:ext uri="{FF2B5EF4-FFF2-40B4-BE49-F238E27FC236}">
+                    <a16:creationId xmlns:a16="http://schemas.microsoft.com/office/drawing/2014/main" id="{B1142884-39D9-3B44-8DDE-946D6A024C7C}"/>
+                  </a:ext>
+                </a:extLst>
+              </p:cNvPr>
+              <p:cNvSpPr/>
+              <p:nvPr/>
+            </p:nvSpPr>
+            <p:spPr>
+              <a:xfrm>
+                <a:off x="9804971" y="1019716"/>
+                <a:ext cx="891250" cy="891250"/>
+              </a:xfrm>
+              <a:prstGeom prst="ellipse">
+                <a:avLst/>
+              </a:prstGeom>
+              <a:noFill/>
+              <a:ln w="38100">
+                <a:solidFill>
+                  <a:schemeClr val="tx1"/>
+                </a:solidFill>
+              </a:ln>
+            </p:spPr>
+            <p:style>
+              <a:lnRef idx="2">
+                <a:schemeClr val="accent1">
+                  <a:shade val="50000"/>
+                </a:schemeClr>
+              </a:lnRef>
+              <a:fillRef idx="1">
+                <a:schemeClr val="accent1"/>
+              </a:fillRef>
+              <a:effectRef idx="0">
+                <a:schemeClr val="accent1"/>
+              </a:effectRef>
+              <a:fontRef idx="minor">
+                <a:schemeClr val="lt1"/>
+              </a:fontRef>
+            </p:style>
+            <p:txBody>
+              <a:bodyPr rtlCol="0" anchor="ctr"/>
+              <a:lstStyle/>
+              <a:p>
+                <a:pPr algn="ctr"/>
+                <a:r>
+                  <a:rPr lang="en-US" sz="3200" dirty="0">
+                    <a:solidFill>
+                      <a:sysClr val="windowText" lastClr="000000"/>
+                    </a:solidFill>
+                  </a:rPr>
+                  <a:t>5</a:t>
+                </a:r>
+              </a:p>
+            </p:txBody>
+          </p:sp>
+          <p:cxnSp>
+            <p:nvCxnSpPr>
+              <p:cNvPr id="17" name="Straight Arrow Connector 16">
+                <a:extLst>
+                  <a:ext uri="{FF2B5EF4-FFF2-40B4-BE49-F238E27FC236}">
+                    <a16:creationId xmlns:a16="http://schemas.microsoft.com/office/drawing/2014/main" id="{03EA2F1E-BE31-694C-81BB-EF8BC7090540}"/>
+                  </a:ext>
+                </a:extLst>
+              </p:cNvPr>
+              <p:cNvCxnSpPr/>
+              <p:nvPr/>
+            </p:nvCxnSpPr>
+            <p:spPr>
+              <a:xfrm>
+                <a:off x="10696221" y="1465341"/>
+                <a:ext cx="918500" cy="0"/>
+              </a:xfrm>
+              <a:prstGeom prst="straightConnector1">
+                <a:avLst/>
+              </a:prstGeom>
+              <a:ln w="38100">
+                <a:solidFill>
+                  <a:schemeClr val="tx1"/>
+                </a:solidFill>
+                <a:tailEnd type="triangle"/>
+              </a:ln>
+            </p:spPr>
+            <p:style>
+              <a:lnRef idx="1">
+                <a:schemeClr val="accent1"/>
+              </a:lnRef>
+              <a:fillRef idx="0">
+                <a:schemeClr val="accent1"/>
+              </a:fillRef>
+              <a:effectRef idx="0">
+                <a:schemeClr val="accent1"/>
+              </a:effectRef>
+              <a:fontRef idx="minor">
+                <a:schemeClr val="tx1"/>
+              </a:fontRef>
+            </p:style>
+          </p:cxnSp>
+        </p:grpSp>
         <p:sp>
           <p:nvSpPr>
-            <p:cNvPr id="5" name="Oval 4">
+            <p:cNvPr id="19" name="Oval 18">
               <a:extLst>
                 <a:ext uri="{FF2B5EF4-FFF2-40B4-BE49-F238E27FC236}">
-                  <a16:creationId xmlns:a16="http://schemas.microsoft.com/office/drawing/2014/main" id="{893A9382-1549-904F-83F2-B24A1FB76ABC}"/>
+                  <a16:creationId xmlns:a16="http://schemas.microsoft.com/office/drawing/2014/main" id="{C9782C46-519B-F54A-A62C-9F554834A998}"/>
                 </a:ext>
               </a:extLst>
             </p:cNvPr>
@@ -25780,8 +26365,8 @@
           </p:nvSpPr>
           <p:spPr>
             <a:xfrm>
-              <a:off x="2597271" y="1019716"/>
-              <a:ext cx="891250" cy="891250"/>
+              <a:off x="814771" y="1215664"/>
+              <a:ext cx="695302" cy="695302"/>
             </a:xfrm>
             <a:prstGeom prst="ellipse">
               <a:avLst/>
@@ -25820,76 +26405,17 @@
                     <a:sysClr val="windowText" lastClr="000000"/>
                   </a:solidFill>
                 </a:rPr>
-                <a:t>1</a:t>
-              </a:r>
-            </a:p>
-          </p:txBody>
-        </p:sp>
-        <p:sp>
-          <p:nvSpPr>
-            <p:cNvPr id="6" name="Oval 5">
-              <a:extLst>
-                <a:ext uri="{FF2B5EF4-FFF2-40B4-BE49-F238E27FC236}">
-                  <a16:creationId xmlns:a16="http://schemas.microsoft.com/office/drawing/2014/main" id="{92DE978B-205D-604F-AD8E-68E6DDEC64D5}"/>
-                </a:ext>
-              </a:extLst>
-            </p:cNvPr>
-            <p:cNvSpPr/>
-            <p:nvPr/>
-          </p:nvSpPr>
-          <p:spPr>
-            <a:xfrm>
-              <a:off x="4407021" y="1019716"/>
-              <a:ext cx="891250" cy="891250"/>
-            </a:xfrm>
-            <a:prstGeom prst="ellipse">
-              <a:avLst/>
-            </a:prstGeom>
-            <a:noFill/>
-            <a:ln w="38100">
-              <a:solidFill>
-                <a:schemeClr val="tx1"/>
-              </a:solidFill>
-            </a:ln>
-          </p:spPr>
-          <p:style>
-            <a:lnRef idx="2">
-              <a:schemeClr val="accent1">
-                <a:shade val="50000"/>
-              </a:schemeClr>
-            </a:lnRef>
-            <a:fillRef idx="1">
-              <a:schemeClr val="accent1"/>
-            </a:fillRef>
-            <a:effectRef idx="0">
-              <a:schemeClr val="accent1"/>
-            </a:effectRef>
-            <a:fontRef idx="minor">
-              <a:schemeClr val="lt1"/>
-            </a:fontRef>
-          </p:style>
-          <p:txBody>
-            <a:bodyPr rtlCol="0" anchor="ctr"/>
-            <a:lstStyle/>
-            <a:p>
-              <a:pPr algn="ctr"/>
-              <a:r>
-                <a:rPr lang="en-US" sz="3200" dirty="0">
-                  <a:solidFill>
-                    <a:sysClr val="windowText" lastClr="000000"/>
-                  </a:solidFill>
-                </a:rPr>
-                <a:t>2</a:t>
+                <a:t>S</a:t>
               </a:r>
             </a:p>
           </p:txBody>
         </p:sp>
         <p:cxnSp>
           <p:nvCxnSpPr>
-            <p:cNvPr id="7" name="Straight Arrow Connector 6">
+            <p:cNvPr id="20" name="Straight Arrow Connector 19">
               <a:extLst>
                 <a:ext uri="{FF2B5EF4-FFF2-40B4-BE49-F238E27FC236}">
-                  <a16:creationId xmlns:a16="http://schemas.microsoft.com/office/drawing/2014/main" id="{36601249-6231-F04D-989B-385C5BA586DC}"/>
+                  <a16:creationId xmlns:a16="http://schemas.microsoft.com/office/drawing/2014/main" id="{C317A940-B5EB-8A4F-9648-211238833058}"/>
                 </a:ext>
               </a:extLst>
             </p:cNvPr>
@@ -25898,412 +26424,8 @@
           </p:nvCxnSpPr>
           <p:spPr>
             <a:xfrm>
-              <a:off x="3488521" y="1465341"/>
-              <a:ext cx="918500" cy="0"/>
-            </a:xfrm>
-            <a:prstGeom prst="straightConnector1">
-              <a:avLst/>
-            </a:prstGeom>
-            <a:ln w="38100">
-              <a:solidFill>
-                <a:schemeClr val="tx1"/>
-              </a:solidFill>
-              <a:tailEnd type="triangle"/>
-            </a:ln>
-          </p:spPr>
-          <p:style>
-            <a:lnRef idx="1">
-              <a:schemeClr val="accent1"/>
-            </a:lnRef>
-            <a:fillRef idx="0">
-              <a:schemeClr val="accent1"/>
-            </a:fillRef>
-            <a:effectRef idx="0">
-              <a:schemeClr val="accent1"/>
-            </a:effectRef>
-            <a:fontRef idx="minor">
-              <a:schemeClr val="tx1"/>
-            </a:fontRef>
-          </p:style>
-        </p:cxnSp>
-        <p:cxnSp>
-          <p:nvCxnSpPr>
-            <p:cNvPr id="8" name="Straight Arrow Connector 7">
-              <a:extLst>
-                <a:ext uri="{FF2B5EF4-FFF2-40B4-BE49-F238E27FC236}">
-                  <a16:creationId xmlns:a16="http://schemas.microsoft.com/office/drawing/2014/main" id="{EA528967-387F-2546-A193-8116B0DFC977}"/>
-                </a:ext>
-              </a:extLst>
-            </p:cNvPr>
-            <p:cNvCxnSpPr/>
-            <p:nvPr/>
-          </p:nvCxnSpPr>
-          <p:spPr>
-            <a:xfrm>
-              <a:off x="5298271" y="1465341"/>
-              <a:ext cx="918500" cy="0"/>
-            </a:xfrm>
-            <a:prstGeom prst="straightConnector1">
-              <a:avLst/>
-            </a:prstGeom>
-            <a:ln w="38100">
-              <a:solidFill>
-                <a:schemeClr val="tx1"/>
-              </a:solidFill>
-              <a:tailEnd type="triangle"/>
-            </a:ln>
-          </p:spPr>
-          <p:style>
-            <a:lnRef idx="1">
-              <a:schemeClr val="accent1"/>
-            </a:lnRef>
-            <a:fillRef idx="0">
-              <a:schemeClr val="accent1"/>
-            </a:fillRef>
-            <a:effectRef idx="0">
-              <a:schemeClr val="accent1"/>
-            </a:effectRef>
-            <a:fontRef idx="minor">
-              <a:schemeClr val="tx1"/>
-            </a:fontRef>
-          </p:style>
-        </p:cxnSp>
-        <p:sp>
-          <p:nvSpPr>
-            <p:cNvPr id="9" name="Oval 8">
-              <a:extLst>
-                <a:ext uri="{FF2B5EF4-FFF2-40B4-BE49-F238E27FC236}">
-                  <a16:creationId xmlns:a16="http://schemas.microsoft.com/office/drawing/2014/main" id="{C3953FE9-4811-BF4E-B143-8DCC5C6F7029}"/>
-                </a:ext>
-              </a:extLst>
-            </p:cNvPr>
-            <p:cNvSpPr/>
-            <p:nvPr/>
-          </p:nvSpPr>
-          <p:spPr>
-            <a:xfrm>
-              <a:off x="11614721" y="1019716"/>
-              <a:ext cx="891250" cy="891250"/>
-            </a:xfrm>
-            <a:prstGeom prst="ellipse">
-              <a:avLst/>
-            </a:prstGeom>
-            <a:noFill/>
-            <a:ln w="38100">
-              <a:solidFill>
-                <a:schemeClr val="tx1"/>
-              </a:solidFill>
-            </a:ln>
-          </p:spPr>
-          <p:style>
-            <a:lnRef idx="2">
-              <a:schemeClr val="accent1">
-                <a:shade val="50000"/>
-              </a:schemeClr>
-            </a:lnRef>
-            <a:fillRef idx="1">
-              <a:schemeClr val="accent1"/>
-            </a:fillRef>
-            <a:effectRef idx="0">
-              <a:schemeClr val="accent1"/>
-            </a:effectRef>
-            <a:fontRef idx="minor">
-              <a:schemeClr val="lt1"/>
-            </a:fontRef>
-          </p:style>
-          <p:txBody>
-            <a:bodyPr rtlCol="0" anchor="ctr"/>
-            <a:lstStyle/>
-            <a:p>
-              <a:pPr algn="ctr"/>
-              <a:r>
-                <a:rPr lang="en-US" sz="3200" dirty="0">
-                  <a:solidFill>
-                    <a:sysClr val="windowText" lastClr="000000"/>
-                  </a:solidFill>
-                </a:rPr>
-                <a:t>T</a:t>
-              </a:r>
-            </a:p>
-          </p:txBody>
-        </p:sp>
-        <p:sp>
-          <p:nvSpPr>
-            <p:cNvPr id="12" name="Oval 11">
-              <a:extLst>
-                <a:ext uri="{FF2B5EF4-FFF2-40B4-BE49-F238E27FC236}">
-                  <a16:creationId xmlns:a16="http://schemas.microsoft.com/office/drawing/2014/main" id="{A250C80C-B89E-D24A-A7AD-EEBE9C8119A0}"/>
-                </a:ext>
-              </a:extLst>
-            </p:cNvPr>
-            <p:cNvSpPr/>
-            <p:nvPr/>
-          </p:nvSpPr>
-          <p:spPr>
-            <a:xfrm>
-              <a:off x="6212721" y="1019716"/>
-              <a:ext cx="891250" cy="891250"/>
-            </a:xfrm>
-            <a:prstGeom prst="ellipse">
-              <a:avLst/>
-            </a:prstGeom>
-            <a:noFill/>
-            <a:ln w="38100">
-              <a:solidFill>
-                <a:schemeClr val="tx1"/>
-              </a:solidFill>
-            </a:ln>
-          </p:spPr>
-          <p:style>
-            <a:lnRef idx="2">
-              <a:schemeClr val="accent1">
-                <a:shade val="50000"/>
-              </a:schemeClr>
-            </a:lnRef>
-            <a:fillRef idx="1">
-              <a:schemeClr val="accent1"/>
-            </a:fillRef>
-            <a:effectRef idx="0">
-              <a:schemeClr val="accent1"/>
-            </a:effectRef>
-            <a:fontRef idx="minor">
-              <a:schemeClr val="lt1"/>
-            </a:fontRef>
-          </p:style>
-          <p:txBody>
-            <a:bodyPr rtlCol="0" anchor="ctr"/>
-            <a:lstStyle/>
-            <a:p>
-              <a:pPr algn="ctr"/>
-              <a:r>
-                <a:rPr lang="en-US" sz="3200" dirty="0">
-                  <a:solidFill>
-                    <a:sysClr val="windowText" lastClr="000000"/>
-                  </a:solidFill>
-                </a:rPr>
-                <a:t>3</a:t>
-              </a:r>
-            </a:p>
-          </p:txBody>
-        </p:sp>
-        <p:sp>
-          <p:nvSpPr>
-            <p:cNvPr id="13" name="Oval 12">
-              <a:extLst>
-                <a:ext uri="{FF2B5EF4-FFF2-40B4-BE49-F238E27FC236}">
-                  <a16:creationId xmlns:a16="http://schemas.microsoft.com/office/drawing/2014/main" id="{9368A4EB-0546-C840-B0CC-2D473D490FD5}"/>
-                </a:ext>
-              </a:extLst>
-            </p:cNvPr>
-            <p:cNvSpPr/>
-            <p:nvPr/>
-          </p:nvSpPr>
-          <p:spPr>
-            <a:xfrm>
-              <a:off x="8022471" y="1019716"/>
-              <a:ext cx="891250" cy="891250"/>
-            </a:xfrm>
-            <a:prstGeom prst="ellipse">
-              <a:avLst/>
-            </a:prstGeom>
-            <a:noFill/>
-            <a:ln w="38100">
-              <a:solidFill>
-                <a:schemeClr val="tx1"/>
-              </a:solidFill>
-            </a:ln>
-          </p:spPr>
-          <p:style>
-            <a:lnRef idx="2">
-              <a:schemeClr val="accent1">
-                <a:shade val="50000"/>
-              </a:schemeClr>
-            </a:lnRef>
-            <a:fillRef idx="1">
-              <a:schemeClr val="accent1"/>
-            </a:fillRef>
-            <a:effectRef idx="0">
-              <a:schemeClr val="accent1"/>
-            </a:effectRef>
-            <a:fontRef idx="minor">
-              <a:schemeClr val="lt1"/>
-            </a:fontRef>
-          </p:style>
-          <p:txBody>
-            <a:bodyPr rtlCol="0" anchor="ctr"/>
-            <a:lstStyle/>
-            <a:p>
-              <a:pPr algn="ctr"/>
-              <a:r>
-                <a:rPr lang="en-US" sz="3200" dirty="0">
-                  <a:solidFill>
-                    <a:sysClr val="windowText" lastClr="000000"/>
-                  </a:solidFill>
-                </a:rPr>
-                <a:t>4</a:t>
-              </a:r>
-            </a:p>
-          </p:txBody>
-        </p:sp>
-        <p:cxnSp>
-          <p:nvCxnSpPr>
-            <p:cNvPr id="14" name="Straight Arrow Connector 13">
-              <a:extLst>
-                <a:ext uri="{FF2B5EF4-FFF2-40B4-BE49-F238E27FC236}">
-                  <a16:creationId xmlns:a16="http://schemas.microsoft.com/office/drawing/2014/main" id="{159E520E-2509-5546-AC70-FB4705BBA269}"/>
-                </a:ext>
-              </a:extLst>
-            </p:cNvPr>
-            <p:cNvCxnSpPr/>
-            <p:nvPr/>
-          </p:nvCxnSpPr>
-          <p:spPr>
-            <a:xfrm>
-              <a:off x="7103971" y="1465341"/>
-              <a:ext cx="918500" cy="0"/>
-            </a:xfrm>
-            <a:prstGeom prst="straightConnector1">
-              <a:avLst/>
-            </a:prstGeom>
-            <a:ln w="38100">
-              <a:solidFill>
-                <a:schemeClr val="tx1"/>
-              </a:solidFill>
-              <a:tailEnd type="triangle"/>
-            </a:ln>
-          </p:spPr>
-          <p:style>
-            <a:lnRef idx="1">
-              <a:schemeClr val="accent1"/>
-            </a:lnRef>
-            <a:fillRef idx="0">
-              <a:schemeClr val="accent1"/>
-            </a:fillRef>
-            <a:effectRef idx="0">
-              <a:schemeClr val="accent1"/>
-            </a:effectRef>
-            <a:fontRef idx="minor">
-              <a:schemeClr val="tx1"/>
-            </a:fontRef>
-          </p:style>
-        </p:cxnSp>
-        <p:cxnSp>
-          <p:nvCxnSpPr>
-            <p:cNvPr id="15" name="Straight Arrow Connector 14">
-              <a:extLst>
-                <a:ext uri="{FF2B5EF4-FFF2-40B4-BE49-F238E27FC236}">
-                  <a16:creationId xmlns:a16="http://schemas.microsoft.com/office/drawing/2014/main" id="{0153D359-2C6C-4041-B3A8-F84C3CE1A5C3}"/>
-                </a:ext>
-              </a:extLst>
-            </p:cNvPr>
-            <p:cNvCxnSpPr/>
-            <p:nvPr/>
-          </p:nvCxnSpPr>
-          <p:spPr>
-            <a:xfrm>
-              <a:off x="8913721" y="1465341"/>
-              <a:ext cx="918500" cy="0"/>
-            </a:xfrm>
-            <a:prstGeom prst="straightConnector1">
-              <a:avLst/>
-            </a:prstGeom>
-            <a:ln w="38100">
-              <a:solidFill>
-                <a:schemeClr val="tx1"/>
-              </a:solidFill>
-              <a:tailEnd type="triangle"/>
-            </a:ln>
-          </p:spPr>
-          <p:style>
-            <a:lnRef idx="1">
-              <a:schemeClr val="accent1"/>
-            </a:lnRef>
-            <a:fillRef idx="0">
-              <a:schemeClr val="accent1"/>
-            </a:fillRef>
-            <a:effectRef idx="0">
-              <a:schemeClr val="accent1"/>
-            </a:effectRef>
-            <a:fontRef idx="minor">
-              <a:schemeClr val="tx1"/>
-            </a:fontRef>
-          </p:style>
-        </p:cxnSp>
-        <p:sp>
-          <p:nvSpPr>
-            <p:cNvPr id="16" name="Oval 15">
-              <a:extLst>
-                <a:ext uri="{FF2B5EF4-FFF2-40B4-BE49-F238E27FC236}">
-                  <a16:creationId xmlns:a16="http://schemas.microsoft.com/office/drawing/2014/main" id="{B1142884-39D9-3B44-8DDE-946D6A024C7C}"/>
-                </a:ext>
-              </a:extLst>
-            </p:cNvPr>
-            <p:cNvSpPr/>
-            <p:nvPr/>
-          </p:nvSpPr>
-          <p:spPr>
-            <a:xfrm>
-              <a:off x="9804971" y="1019716"/>
-              <a:ext cx="891250" cy="891250"/>
-            </a:xfrm>
-            <a:prstGeom prst="ellipse">
-              <a:avLst/>
-            </a:prstGeom>
-            <a:noFill/>
-            <a:ln w="38100">
-              <a:solidFill>
-                <a:schemeClr val="tx1"/>
-              </a:solidFill>
-            </a:ln>
-          </p:spPr>
-          <p:style>
-            <a:lnRef idx="2">
-              <a:schemeClr val="accent1">
-                <a:shade val="50000"/>
-              </a:schemeClr>
-            </a:lnRef>
-            <a:fillRef idx="1">
-              <a:schemeClr val="accent1"/>
-            </a:fillRef>
-            <a:effectRef idx="0">
-              <a:schemeClr val="accent1"/>
-            </a:effectRef>
-            <a:fontRef idx="minor">
-              <a:schemeClr val="lt1"/>
-            </a:fontRef>
-          </p:style>
-          <p:txBody>
-            <a:bodyPr rtlCol="0" anchor="ctr"/>
-            <a:lstStyle/>
-            <a:p>
-              <a:pPr algn="ctr"/>
-              <a:r>
-                <a:rPr lang="en-US" sz="3200" dirty="0">
-                  <a:solidFill>
-                    <a:sysClr val="windowText" lastClr="000000"/>
-                  </a:solidFill>
-                </a:rPr>
-                <a:t>5</a:t>
-              </a:r>
-            </a:p>
-          </p:txBody>
-        </p:sp>
-        <p:cxnSp>
-          <p:nvCxnSpPr>
-            <p:cNvPr id="17" name="Straight Arrow Connector 16">
-              <a:extLst>
-                <a:ext uri="{FF2B5EF4-FFF2-40B4-BE49-F238E27FC236}">
-                  <a16:creationId xmlns:a16="http://schemas.microsoft.com/office/drawing/2014/main" id="{03EA2F1E-BE31-694C-81BB-EF8BC7090540}"/>
-                </a:ext>
-              </a:extLst>
-            </p:cNvPr>
-            <p:cNvCxnSpPr/>
-            <p:nvPr/>
-          </p:nvCxnSpPr>
-          <p:spPr>
-            <a:xfrm>
-              <a:off x="10696221" y="1465341"/>
-              <a:ext cx="918500" cy="0"/>
+              <a:off x="1510073" y="1563315"/>
+              <a:ext cx="716561" cy="0"/>
             </a:xfrm>
             <a:prstGeom prst="straightConnector1">
               <a:avLst/>

</xml_diff>